<commit_message>
app name tbd and group member names added
</commit_message>
<xml_diff>
--- a/05 Team/Team Presentation.pptx
+++ b/05 Team/Team Presentation.pptx
@@ -104,6 +104,11 @@
       </a:defRPr>
     </a:lvl9pPr>
   </p:defaultTextStyle>
+  <p:extLst>
+    <p:ext uri="{EFAFB233-063F-42B5-8137-9DF3F51BA10A}">
+      <p15:sldGuideLst xmlns:p15="http://schemas.microsoft.com/office/powerpoint/2012/main"/>
+    </p:ext>
+  </p:extLst>
 </p:presentation>
 </file>
 
@@ -2979,7 +2984,11 @@
           <a:bodyPr/>
           <a:lstStyle/>
           <a:p>
-            <a:endParaRPr lang="en-US"/>
+            <a:r>
+              <a:rPr lang="en-US" smtClean="0"/>
+              <a:t>“Title TBD”</a:t>
+            </a:r>
+            <a:endParaRPr lang="en-US" dirty="0"/>
           </a:p>
         </p:txBody>
       </p:sp>
@@ -2995,10 +3004,75 @@
         </p:nvSpPr>
         <p:spPr/>
         <p:txBody>
-          <a:bodyPr/>
-          <a:lstStyle/>
-          <a:p>
-            <a:endParaRPr lang="en-US"/>
+          <a:bodyPr>
+            <a:normAutofit fontScale="77500" lnSpcReduction="20000"/>
+          </a:bodyPr>
+          <a:lstStyle/>
+          <a:p>
+            <a:r>
+              <a:rPr lang="en-US" dirty="0" err="1" smtClean="0"/>
+              <a:t>Ortagus</a:t>
+            </a:r>
+            <a:r>
+              <a:rPr lang="en-US" dirty="0" smtClean="0"/>
+              <a:t> Winfrey</a:t>
+            </a:r>
+          </a:p>
+          <a:p>
+            <a:r>
+              <a:rPr lang="en-US" dirty="0" err="1" smtClean="0"/>
+              <a:t>Mechal</a:t>
+            </a:r>
+            <a:r>
+              <a:rPr lang="en-US" dirty="0" smtClean="0"/>
+              <a:t> </a:t>
+            </a:r>
+            <a:r>
+              <a:rPr lang="en-US" dirty="0" err="1" smtClean="0"/>
+              <a:t>Terfie</a:t>
+            </a:r>
+            <a:endParaRPr lang="en-US" dirty="0" smtClean="0"/>
+          </a:p>
+          <a:p>
+            <a:r>
+              <a:rPr lang="en-US" dirty="0" err="1" smtClean="0"/>
+              <a:t>Shenila</a:t>
+            </a:r>
+            <a:r>
+              <a:rPr lang="en-US" dirty="0" smtClean="0"/>
+              <a:t> </a:t>
+            </a:r>
+            <a:r>
+              <a:rPr lang="en-US" dirty="0" err="1" smtClean="0"/>
+              <a:t>Daredia</a:t>
+            </a:r>
+            <a:endParaRPr lang="en-US" dirty="0" smtClean="0"/>
+          </a:p>
+          <a:p>
+            <a:r>
+              <a:rPr lang="en-US" dirty="0" err="1" smtClean="0"/>
+              <a:t>Dalya</a:t>
+            </a:r>
+            <a:r>
+              <a:rPr lang="en-US" dirty="0" smtClean="0"/>
+              <a:t> </a:t>
+            </a:r>
+            <a:r>
+              <a:rPr lang="en-US" dirty="0" err="1" smtClean="0"/>
+              <a:t>Khatun</a:t>
+            </a:r>
+            <a:endParaRPr lang="en-US" dirty="0" smtClean="0"/>
+          </a:p>
+          <a:p>
+            <a:r>
+              <a:rPr lang="en-US" dirty="0" smtClean="0"/>
+              <a:t>Ryan </a:t>
+            </a:r>
+            <a:r>
+              <a:rPr lang="en-US" dirty="0" err="1" smtClean="0"/>
+              <a:t>Ocampo</a:t>
+            </a:r>
+            <a:endParaRPr lang="en-US" dirty="0"/>
           </a:p>
         </p:txBody>
       </p:sp>

</xml_diff>